<commit_message>
Adding lecture 3 slides
</commit_message>
<xml_diff>
--- a/Lecture 2.pptx
+++ b/Lecture 2.pptx
@@ -3518,8 +3518,13 @@
           <a:p>
             <a:r>
               <a:rPr lang="en-IN" dirty="0"/>
-              <a:t>Note Single line Comments -//</a:t>
-            </a:r>
+              <a:t>Note Single line </a:t>
+            </a:r>
+            <a:r>
+              <a:rPr lang="en-IN"/>
+              <a:t>Comments -#</a:t>
+            </a:r>
+            <a:endParaRPr lang="en-IN" dirty="0"/>
           </a:p>
           <a:p>
             <a:pPr lvl="1"/>

</xml_diff>